<commit_message>
after the day 2
</commit_message>
<xml_diff>
--- a/2_basic_regression.pptx
+++ b/2_basic_regression.pptx
@@ -289,7 +289,7 @@
           <a:p>
             <a:fld id="{F7586D47-F1F0-42DF-BED0-72444DD7BEDA}" type="datetimeFigureOut">
               <a:rPr lang="en-ID" smtClean="0"/>
-              <a:t>07/08/2021</a:t>
+              <a:t>08/08/2021</a:t>
             </a:fld>
             <a:endParaRPr lang="en-ID"/>
           </a:p>
@@ -489,7 +489,7 @@
           <a:p>
             <a:fld id="{F7586D47-F1F0-42DF-BED0-72444DD7BEDA}" type="datetimeFigureOut">
               <a:rPr lang="en-ID" smtClean="0"/>
-              <a:t>07/08/2021</a:t>
+              <a:t>08/08/2021</a:t>
             </a:fld>
             <a:endParaRPr lang="en-ID"/>
           </a:p>
@@ -699,7 +699,7 @@
           <a:p>
             <a:fld id="{F7586D47-F1F0-42DF-BED0-72444DD7BEDA}" type="datetimeFigureOut">
               <a:rPr lang="en-ID" smtClean="0"/>
-              <a:t>07/08/2021</a:t>
+              <a:t>08/08/2021</a:t>
             </a:fld>
             <a:endParaRPr lang="en-ID"/>
           </a:p>
@@ -899,7 +899,7 @@
           <a:p>
             <a:fld id="{F7586D47-F1F0-42DF-BED0-72444DD7BEDA}" type="datetimeFigureOut">
               <a:rPr lang="en-ID" smtClean="0"/>
-              <a:t>07/08/2021</a:t>
+              <a:t>08/08/2021</a:t>
             </a:fld>
             <a:endParaRPr lang="en-ID"/>
           </a:p>
@@ -1175,7 +1175,7 @@
           <a:p>
             <a:fld id="{F7586D47-F1F0-42DF-BED0-72444DD7BEDA}" type="datetimeFigureOut">
               <a:rPr lang="en-ID" smtClean="0"/>
-              <a:t>07/08/2021</a:t>
+              <a:t>08/08/2021</a:t>
             </a:fld>
             <a:endParaRPr lang="en-ID"/>
           </a:p>
@@ -1443,7 +1443,7 @@
           <a:p>
             <a:fld id="{F7586D47-F1F0-42DF-BED0-72444DD7BEDA}" type="datetimeFigureOut">
               <a:rPr lang="en-ID" smtClean="0"/>
-              <a:t>07/08/2021</a:t>
+              <a:t>08/08/2021</a:t>
             </a:fld>
             <a:endParaRPr lang="en-ID"/>
           </a:p>
@@ -1858,7 +1858,7 @@
           <a:p>
             <a:fld id="{F7586D47-F1F0-42DF-BED0-72444DD7BEDA}" type="datetimeFigureOut">
               <a:rPr lang="en-ID" smtClean="0"/>
-              <a:t>07/08/2021</a:t>
+              <a:t>08/08/2021</a:t>
             </a:fld>
             <a:endParaRPr lang="en-ID"/>
           </a:p>
@@ -2000,7 +2000,7 @@
           <a:p>
             <a:fld id="{F7586D47-F1F0-42DF-BED0-72444DD7BEDA}" type="datetimeFigureOut">
               <a:rPr lang="en-ID" smtClean="0"/>
-              <a:t>07/08/2021</a:t>
+              <a:t>08/08/2021</a:t>
             </a:fld>
             <a:endParaRPr lang="en-ID"/>
           </a:p>
@@ -2113,7 +2113,7 @@
           <a:p>
             <a:fld id="{F7586D47-F1F0-42DF-BED0-72444DD7BEDA}" type="datetimeFigureOut">
               <a:rPr lang="en-ID" smtClean="0"/>
-              <a:t>07/08/2021</a:t>
+              <a:t>08/08/2021</a:t>
             </a:fld>
             <a:endParaRPr lang="en-ID"/>
           </a:p>
@@ -2426,7 +2426,7 @@
           <a:p>
             <a:fld id="{F7586D47-F1F0-42DF-BED0-72444DD7BEDA}" type="datetimeFigureOut">
               <a:rPr lang="en-ID" smtClean="0"/>
-              <a:t>07/08/2021</a:t>
+              <a:t>08/08/2021</a:t>
             </a:fld>
             <a:endParaRPr lang="en-ID"/>
           </a:p>
@@ -2715,7 +2715,7 @@
           <a:p>
             <a:fld id="{F7586D47-F1F0-42DF-BED0-72444DD7BEDA}" type="datetimeFigureOut">
               <a:rPr lang="en-ID" smtClean="0"/>
-              <a:t>07/08/2021</a:t>
+              <a:t>08/08/2021</a:t>
             </a:fld>
             <a:endParaRPr lang="en-ID"/>
           </a:p>
@@ -2958,7 +2958,7 @@
           <a:p>
             <a:fld id="{F7586D47-F1F0-42DF-BED0-72444DD7BEDA}" type="datetimeFigureOut">
               <a:rPr lang="en-ID" smtClean="0"/>
-              <a:t>07/08/2021</a:t>
+              <a:t>08/08/2021</a:t>
             </a:fld>
             <a:endParaRPr lang="en-ID"/>
           </a:p>
@@ -6936,8 +6936,8 @@
           </a:p>
         </p:txBody>
       </p:sp>
-      <mc:AlternateContent xmlns:mc="http://schemas.openxmlformats.org/markup-compatibility/2006">
-        <mc:Choice xmlns:a14="http://schemas.microsoft.com/office/drawing/2010/main" Requires="a14">
+      <mc:AlternateContent xmlns:mc="http://schemas.openxmlformats.org/markup-compatibility/2006" xmlns:a14="http://schemas.microsoft.com/office/drawing/2010/main">
+        <mc:Choice Requires="a14">
           <p:sp>
             <p:nvSpPr>
               <p:cNvPr id="3" name="Content Placeholder 2">
@@ -7373,7 +7373,7 @@
             </p:txBody>
           </p:sp>
         </mc:Choice>
-        <mc:Fallback>
+        <mc:Fallback xmlns="">
           <p:sp>
             <p:nvSpPr>
               <p:cNvPr id="3" name="Content Placeholder 2">
@@ -8494,8 +8494,8 @@
           </a:p>
         </p:txBody>
       </p:sp>
-      <mc:AlternateContent xmlns:mc="http://schemas.openxmlformats.org/markup-compatibility/2006">
-        <mc:Choice xmlns:a14="http://schemas.microsoft.com/office/drawing/2010/main" Requires="a14">
+      <mc:AlternateContent xmlns:mc="http://schemas.openxmlformats.org/markup-compatibility/2006" xmlns:a14="http://schemas.microsoft.com/office/drawing/2010/main">
+        <mc:Choice Requires="a14">
           <p:sp>
             <p:nvSpPr>
               <p:cNvPr id="3" name="Content Placeholder 2">
@@ -8736,7 +8736,7 @@
             </p:txBody>
           </p:sp>
         </mc:Choice>
-        <mc:Fallback>
+        <mc:Fallback xmlns="">
           <p:sp>
             <p:nvSpPr>
               <p:cNvPr id="3" name="Content Placeholder 2">
@@ -8875,8 +8875,8 @@
           </a:p>
         </p:txBody>
       </p:sp>
-      <mc:AlternateContent xmlns:mc="http://schemas.openxmlformats.org/markup-compatibility/2006">
-        <mc:Choice xmlns:a14="http://schemas.microsoft.com/office/drawing/2010/main" Requires="a14">
+      <mc:AlternateContent xmlns:mc="http://schemas.openxmlformats.org/markup-compatibility/2006" xmlns:a14="http://schemas.microsoft.com/office/drawing/2010/main">
+        <mc:Choice Requires="a14">
           <p:sp>
             <p:nvSpPr>
               <p:cNvPr id="3" name="Content Placeholder 2">
@@ -9194,7 +9194,7 @@
             </p:txBody>
           </p:sp>
         </mc:Choice>
-        <mc:Fallback>
+        <mc:Fallback xmlns="">
           <p:sp>
             <p:nvSpPr>
               <p:cNvPr id="3" name="Content Placeholder 2">
@@ -9333,8 +9333,8 @@
           </a:p>
         </p:txBody>
       </p:sp>
-      <mc:AlternateContent xmlns:mc="http://schemas.openxmlformats.org/markup-compatibility/2006">
-        <mc:Choice xmlns:a14="http://schemas.microsoft.com/office/drawing/2010/main" Requires="a14">
+      <mc:AlternateContent xmlns:mc="http://schemas.openxmlformats.org/markup-compatibility/2006" xmlns:a14="http://schemas.microsoft.com/office/drawing/2010/main">
+        <mc:Choice Requires="a14">
           <p:sp>
             <p:nvSpPr>
               <p:cNvPr id="3" name="Content Placeholder 2">
@@ -9554,7 +9554,7 @@
             </p:txBody>
           </p:sp>
         </mc:Choice>
-        <mc:Fallback>
+        <mc:Fallback xmlns="">
           <p:sp>
             <p:nvSpPr>
               <p:cNvPr id="3" name="Content Placeholder 2">
@@ -10902,8 +10902,8 @@
               </p:txBody>
             </p:sp>
           </p:grpSp>
-          <mc:AlternateContent xmlns:mc="http://schemas.openxmlformats.org/markup-compatibility/2006">
-            <mc:Choice xmlns:a14="http://schemas.microsoft.com/office/drawing/2010/main" Requires="a14">
+          <mc:AlternateContent xmlns:mc="http://schemas.openxmlformats.org/markup-compatibility/2006" xmlns:a14="http://schemas.microsoft.com/office/drawing/2010/main">
+            <mc:Choice Requires="a14">
               <p:sp>
                 <p:nvSpPr>
                   <p:cNvPr id="67" name="TextBox 66">
@@ -10954,7 +10954,7 @@
                 </p:txBody>
               </p:sp>
             </mc:Choice>
-            <mc:Fallback>
+            <mc:Fallback xmlns="">
               <p:sp>
                 <p:nvSpPr>
                   <p:cNvPr id="67" name="TextBox 66">
@@ -10999,8 +10999,8 @@
               </p:sp>
             </mc:Fallback>
           </mc:AlternateContent>
-          <mc:AlternateContent xmlns:mc="http://schemas.openxmlformats.org/markup-compatibility/2006">
-            <mc:Choice xmlns:a14="http://schemas.microsoft.com/office/drawing/2010/main" Requires="a14">
+          <mc:AlternateContent xmlns:mc="http://schemas.openxmlformats.org/markup-compatibility/2006" xmlns:a14="http://schemas.microsoft.com/office/drawing/2010/main">
+            <mc:Choice Requires="a14">
               <p:sp>
                 <p:nvSpPr>
                   <p:cNvPr id="68" name="TextBox 67">
@@ -11050,7 +11050,7 @@
                 </p:txBody>
               </p:sp>
             </mc:Choice>
-            <mc:Fallback>
+            <mc:Fallback xmlns="">
               <p:sp>
                 <p:nvSpPr>
                   <p:cNvPr id="68" name="TextBox 67">
@@ -11095,8 +11095,8 @@
               </p:sp>
             </mc:Fallback>
           </mc:AlternateContent>
-          <mc:AlternateContent xmlns:mc="http://schemas.openxmlformats.org/markup-compatibility/2006">
-            <mc:Choice xmlns:a14="http://schemas.microsoft.com/office/drawing/2010/main" Requires="a14">
+          <mc:AlternateContent xmlns:mc="http://schemas.openxmlformats.org/markup-compatibility/2006" xmlns:a14="http://schemas.microsoft.com/office/drawing/2010/main">
+            <mc:Choice Requires="a14">
               <p:sp>
                 <p:nvSpPr>
                   <p:cNvPr id="69" name="TextBox 68">
@@ -11152,7 +11152,7 @@
                 </p:txBody>
               </p:sp>
             </mc:Choice>
-            <mc:Fallback>
+            <mc:Fallback xmlns="">
               <p:sp>
                 <p:nvSpPr>
                   <p:cNvPr id="69" name="TextBox 68">
@@ -11197,8 +11197,8 @@
               </p:sp>
             </mc:Fallback>
           </mc:AlternateContent>
-          <mc:AlternateContent xmlns:mc="http://schemas.openxmlformats.org/markup-compatibility/2006">
-            <mc:Choice xmlns:a14="http://schemas.microsoft.com/office/drawing/2010/main" Requires="a14">
+          <mc:AlternateContent xmlns:mc="http://schemas.openxmlformats.org/markup-compatibility/2006" xmlns:a14="http://schemas.microsoft.com/office/drawing/2010/main">
+            <mc:Choice Requires="a14">
               <p:sp>
                 <p:nvSpPr>
                   <p:cNvPr id="70" name="TextBox 69">
@@ -11254,7 +11254,7 @@
                 </p:txBody>
               </p:sp>
             </mc:Choice>
-            <mc:Fallback>
+            <mc:Fallback xmlns="">
               <p:sp>
                 <p:nvSpPr>
                   <p:cNvPr id="70" name="TextBox 69">
@@ -11299,8 +11299,8 @@
               </p:sp>
             </mc:Fallback>
           </mc:AlternateContent>
-          <mc:AlternateContent xmlns:mc="http://schemas.openxmlformats.org/markup-compatibility/2006">
-            <mc:Choice xmlns:a14="http://schemas.microsoft.com/office/drawing/2010/main" Requires="a14">
+          <mc:AlternateContent xmlns:mc="http://schemas.openxmlformats.org/markup-compatibility/2006" xmlns:a14="http://schemas.microsoft.com/office/drawing/2010/main">
+            <mc:Choice Requires="a14">
               <p:sp>
                 <p:nvSpPr>
                   <p:cNvPr id="71" name="TextBox 70">
@@ -11350,7 +11350,7 @@
                 </p:txBody>
               </p:sp>
             </mc:Choice>
-            <mc:Fallback>
+            <mc:Fallback xmlns="">
               <p:sp>
                 <p:nvSpPr>
                   <p:cNvPr id="71" name="TextBox 70">
@@ -11395,8 +11395,8 @@
               </p:sp>
             </mc:Fallback>
           </mc:AlternateContent>
-          <mc:AlternateContent xmlns:mc="http://schemas.openxmlformats.org/markup-compatibility/2006">
-            <mc:Choice xmlns:a14="http://schemas.microsoft.com/office/drawing/2010/main" Requires="a14">
+          <mc:AlternateContent xmlns:mc="http://schemas.openxmlformats.org/markup-compatibility/2006" xmlns:a14="http://schemas.microsoft.com/office/drawing/2010/main">
+            <mc:Choice Requires="a14">
               <p:sp>
                 <p:nvSpPr>
                   <p:cNvPr id="72" name="TextBox 71">
@@ -11446,7 +11446,7 @@
                 </p:txBody>
               </p:sp>
             </mc:Choice>
-            <mc:Fallback>
+            <mc:Fallback xmlns="">
               <p:sp>
                 <p:nvSpPr>
                   <p:cNvPr id="72" name="TextBox 71">
@@ -11491,8 +11491,8 @@
               </p:sp>
             </mc:Fallback>
           </mc:AlternateContent>
-          <mc:AlternateContent xmlns:mc="http://schemas.openxmlformats.org/markup-compatibility/2006">
-            <mc:Choice xmlns:a14="http://schemas.microsoft.com/office/drawing/2010/main" Requires="a14">
+          <mc:AlternateContent xmlns:mc="http://schemas.openxmlformats.org/markup-compatibility/2006" xmlns:a14="http://schemas.microsoft.com/office/drawing/2010/main">
+            <mc:Choice Requires="a14">
               <p:sp>
                 <p:nvSpPr>
                   <p:cNvPr id="73" name="TextBox 72">
@@ -11548,7 +11548,7 @@
                 </p:txBody>
               </p:sp>
             </mc:Choice>
-            <mc:Fallback>
+            <mc:Fallback xmlns="">
               <p:sp>
                 <p:nvSpPr>
                   <p:cNvPr id="73" name="TextBox 72">
@@ -11593,8 +11593,8 @@
               </p:sp>
             </mc:Fallback>
           </mc:AlternateContent>
-          <mc:AlternateContent xmlns:mc="http://schemas.openxmlformats.org/markup-compatibility/2006">
-            <mc:Choice xmlns:a14="http://schemas.microsoft.com/office/drawing/2010/main" Requires="a14">
+          <mc:AlternateContent xmlns:mc="http://schemas.openxmlformats.org/markup-compatibility/2006" xmlns:a14="http://schemas.microsoft.com/office/drawing/2010/main">
+            <mc:Choice Requires="a14">
               <p:sp>
                 <p:nvSpPr>
                   <p:cNvPr id="74" name="TextBox 73">
@@ -11634,13 +11634,7 @@
                             <a:rPr lang="en-US" sz="2400" b="0" i="1" smtClean="0">
                               <a:latin typeface="Cambria Math" panose="02040503050406030204" pitchFamily="18" charset="0"/>
                             </a:rPr>
-                            <m:t>10</m:t>
-                          </m:r>
-                          <m:r>
-                            <a:rPr lang="en-US" sz="2400" b="0" i="1" smtClean="0">
-                              <a:latin typeface="Cambria Math" panose="02040503050406030204" pitchFamily="18" charset="0"/>
-                            </a:rPr>
-                            <m:t>00</m:t>
+                            <m:t>1000</m:t>
                           </m:r>
                         </m:oMath>
                       </m:oMathPara>
@@ -11650,7 +11644,7 @@
                 </p:txBody>
               </p:sp>
             </mc:Choice>
-            <mc:Fallback>
+            <mc:Fallback xmlns="">
               <p:sp>
                 <p:nvSpPr>
                   <p:cNvPr id="74" name="TextBox 73">
@@ -11695,8 +11689,8 @@
               </p:sp>
             </mc:Fallback>
           </mc:AlternateContent>
-          <mc:AlternateContent xmlns:mc="http://schemas.openxmlformats.org/markup-compatibility/2006">
-            <mc:Choice xmlns:a14="http://schemas.microsoft.com/office/drawing/2010/main" Requires="a14">
+          <mc:AlternateContent xmlns:mc="http://schemas.openxmlformats.org/markup-compatibility/2006" xmlns:a14="http://schemas.microsoft.com/office/drawing/2010/main">
+            <mc:Choice Requires="a14">
               <p:sp>
                 <p:nvSpPr>
                   <p:cNvPr id="75" name="TextBox 74">
@@ -11736,13 +11730,7 @@
                             <a:rPr lang="en-US" sz="2400" b="0" i="1" smtClean="0">
                               <a:latin typeface="Cambria Math" panose="02040503050406030204" pitchFamily="18" charset="0"/>
                             </a:rPr>
-                            <m:t>15</m:t>
-                          </m:r>
-                          <m:r>
-                            <a:rPr lang="en-US" sz="2400" b="0" i="1" smtClean="0">
-                              <a:latin typeface="Cambria Math" panose="02040503050406030204" pitchFamily="18" charset="0"/>
-                            </a:rPr>
-                            <m:t>00</m:t>
+                            <m:t>1500</m:t>
                           </m:r>
                         </m:oMath>
                       </m:oMathPara>
@@ -11752,7 +11740,7 @@
                 </p:txBody>
               </p:sp>
             </mc:Choice>
-            <mc:Fallback>
+            <mc:Fallback xmlns="">
               <p:sp>
                 <p:nvSpPr>
                   <p:cNvPr id="75" name="TextBox 74">
@@ -11797,8 +11785,8 @@
               </p:sp>
             </mc:Fallback>
           </mc:AlternateContent>
-          <mc:AlternateContent xmlns:mc="http://schemas.openxmlformats.org/markup-compatibility/2006">
-            <mc:Choice xmlns:a14="http://schemas.microsoft.com/office/drawing/2010/main" Requires="a14">
+          <mc:AlternateContent xmlns:mc="http://schemas.openxmlformats.org/markup-compatibility/2006" xmlns:a14="http://schemas.microsoft.com/office/drawing/2010/main">
+            <mc:Choice Requires="a14">
               <p:sp>
                 <p:nvSpPr>
                   <p:cNvPr id="76" name="TextBox 75">
@@ -11838,13 +11826,7 @@
                             <a:rPr lang="en-US" sz="2400" b="0" i="1" smtClean="0">
                               <a:latin typeface="Cambria Math" panose="02040503050406030204" pitchFamily="18" charset="0"/>
                             </a:rPr>
-                            <m:t>20</m:t>
-                          </m:r>
-                          <m:r>
-                            <a:rPr lang="en-US" sz="2400" b="0" i="1" smtClean="0">
-                              <a:latin typeface="Cambria Math" panose="02040503050406030204" pitchFamily="18" charset="0"/>
-                            </a:rPr>
-                            <m:t>00</m:t>
+                            <m:t>2000</m:t>
                           </m:r>
                         </m:oMath>
                       </m:oMathPara>
@@ -11854,7 +11836,7 @@
                 </p:txBody>
               </p:sp>
             </mc:Choice>
-            <mc:Fallback>
+            <mc:Fallback xmlns="">
               <p:sp>
                 <p:nvSpPr>
                   <p:cNvPr id="76" name="TextBox 75">
@@ -11899,8 +11881,8 @@
               </p:sp>
             </mc:Fallback>
           </mc:AlternateContent>
-          <mc:AlternateContent xmlns:mc="http://schemas.openxmlformats.org/markup-compatibility/2006">
-            <mc:Choice xmlns:a14="http://schemas.microsoft.com/office/drawing/2010/main" Requires="a14">
+          <mc:AlternateContent xmlns:mc="http://schemas.openxmlformats.org/markup-compatibility/2006" xmlns:a14="http://schemas.microsoft.com/office/drawing/2010/main">
+            <mc:Choice Requires="a14">
               <p:sp>
                 <p:nvSpPr>
                   <p:cNvPr id="77" name="TextBox 76">
@@ -11940,13 +11922,7 @@
                             <a:rPr lang="en-US" sz="2400" b="0" i="1" smtClean="0">
                               <a:latin typeface="Cambria Math" panose="02040503050406030204" pitchFamily="18" charset="0"/>
                             </a:rPr>
-                            <m:t>25</m:t>
-                          </m:r>
-                          <m:r>
-                            <a:rPr lang="en-US" sz="2400" b="0" i="1" smtClean="0">
-                              <a:latin typeface="Cambria Math" panose="02040503050406030204" pitchFamily="18" charset="0"/>
-                            </a:rPr>
-                            <m:t>00</m:t>
+                            <m:t>2500</m:t>
                           </m:r>
                         </m:oMath>
                       </m:oMathPara>
@@ -11956,7 +11932,7 @@
                 </p:txBody>
               </p:sp>
             </mc:Choice>
-            <mc:Fallback>
+            <mc:Fallback xmlns="">
               <p:sp>
                 <p:nvSpPr>
                   <p:cNvPr id="77" name="TextBox 76">
@@ -12002,8 +11978,8 @@
             </mc:Fallback>
           </mc:AlternateContent>
         </p:grpSp>
-        <mc:AlternateContent xmlns:mc="http://schemas.openxmlformats.org/markup-compatibility/2006">
-          <mc:Choice xmlns:a14="http://schemas.microsoft.com/office/drawing/2010/main" Requires="a14">
+        <mc:AlternateContent xmlns:mc="http://schemas.openxmlformats.org/markup-compatibility/2006" xmlns:a14="http://schemas.microsoft.com/office/drawing/2010/main">
+          <mc:Choice Requires="a14">
             <p:sp>
               <p:nvSpPr>
                 <p:cNvPr id="80" name="TextBox 79">
@@ -12077,7 +12053,7 @@
               </p:txBody>
             </p:sp>
           </mc:Choice>
-          <mc:Fallback>
+          <mc:Fallback xmlns="">
             <p:sp>
               <p:nvSpPr>
                 <p:cNvPr id="80" name="TextBox 79">
@@ -12122,8 +12098,8 @@
             </p:sp>
           </mc:Fallback>
         </mc:AlternateContent>
-        <mc:AlternateContent xmlns:mc="http://schemas.openxmlformats.org/markup-compatibility/2006">
-          <mc:Choice xmlns:a14="http://schemas.microsoft.com/office/drawing/2010/main" Requires="a14">
+        <mc:AlternateContent xmlns:mc="http://schemas.openxmlformats.org/markup-compatibility/2006" xmlns:a14="http://schemas.microsoft.com/office/drawing/2010/main">
+          <mc:Choice Requires="a14">
             <p:sp>
               <p:nvSpPr>
                 <p:cNvPr id="81" name="TextBox 80">
@@ -12197,7 +12173,7 @@
               </p:txBody>
             </p:sp>
           </mc:Choice>
-          <mc:Fallback>
+          <mc:Fallback xmlns="">
             <p:sp>
               <p:nvSpPr>
                 <p:cNvPr id="81" name="TextBox 80">
@@ -12725,8 +12701,8 @@
           </a:p>
         </p:txBody>
       </p:sp>
-      <mc:AlternateContent xmlns:mc="http://schemas.openxmlformats.org/markup-compatibility/2006">
-        <mc:Choice xmlns:a14="http://schemas.microsoft.com/office/drawing/2010/main" Requires="a14">
+      <mc:AlternateContent xmlns:mc="http://schemas.openxmlformats.org/markup-compatibility/2006" xmlns:a14="http://schemas.microsoft.com/office/drawing/2010/main">
+        <mc:Choice Requires="a14">
           <p:sp>
             <p:nvSpPr>
               <p:cNvPr id="3" name="Content Placeholder 2">
@@ -12936,7 +12912,7 @@
             </p:txBody>
           </p:sp>
         </mc:Choice>
-        <mc:Fallback>
+        <mc:Fallback xmlns="">
           <p:sp>
             <p:nvSpPr>
               <p:cNvPr id="3" name="Content Placeholder 2">
@@ -13164,8 +13140,8 @@
           </a:p>
         </p:txBody>
       </p:sp>
-      <mc:AlternateContent xmlns:mc="http://schemas.openxmlformats.org/markup-compatibility/2006">
-        <mc:Choice xmlns:a14="http://schemas.microsoft.com/office/drawing/2010/main" Requires="a14">
+      <mc:AlternateContent xmlns:mc="http://schemas.openxmlformats.org/markup-compatibility/2006" xmlns:a14="http://schemas.microsoft.com/office/drawing/2010/main">
+        <mc:Choice Requires="a14">
           <p:sp>
             <p:nvSpPr>
               <p:cNvPr id="6" name="Content Placeholder 5">
@@ -13352,7 +13328,7 @@
             </p:txBody>
           </p:sp>
         </mc:Choice>
-        <mc:Fallback>
+        <mc:Fallback xmlns="">
           <p:sp>
             <p:nvSpPr>
               <p:cNvPr id="6" name="Content Placeholder 5">
@@ -13650,8 +13626,8 @@
           </a:prstGeom>
         </p:spPr>
       </p:pic>
-      <mc:AlternateContent xmlns:mc="http://schemas.openxmlformats.org/markup-compatibility/2006">
-        <mc:Choice xmlns:a14="http://schemas.microsoft.com/office/drawing/2010/main" Requires="a14">
+      <mc:AlternateContent xmlns:mc="http://schemas.openxmlformats.org/markup-compatibility/2006" xmlns:a14="http://schemas.microsoft.com/office/drawing/2010/main">
+        <mc:Choice Requires="a14">
           <p:sp>
             <p:nvSpPr>
               <p:cNvPr id="8" name="TextBox 7">
@@ -13888,7 +13864,7 @@
             </p:txBody>
           </p:sp>
         </mc:Choice>
-        <mc:Fallback>
+        <mc:Fallback xmlns="">
           <p:sp>
             <p:nvSpPr>
               <p:cNvPr id="8" name="TextBox 7">
@@ -13933,8 +13909,8 @@
           </p:sp>
         </mc:Fallback>
       </mc:AlternateContent>
-      <mc:AlternateContent xmlns:mc="http://schemas.openxmlformats.org/markup-compatibility/2006">
-        <mc:Choice xmlns:a14="http://schemas.microsoft.com/office/drawing/2010/main" Requires="a14">
+      <mc:AlternateContent xmlns:mc="http://schemas.openxmlformats.org/markup-compatibility/2006" xmlns:a14="http://schemas.microsoft.com/office/drawing/2010/main">
+        <mc:Choice Requires="a14">
           <p:sp>
             <p:nvSpPr>
               <p:cNvPr id="11" name="TextBox 10">
@@ -13963,6 +13939,7 @@
               </a:bodyPr>
               <a:lstStyle/>
               <a:p>
+                <a:pPr/>
                 <a14:m>
                   <m:oMathPara xmlns:m="http://schemas.openxmlformats.org/officeDocument/2006/math">
                     <m:oMathParaPr>
@@ -14175,7 +14152,7 @@
             </p:txBody>
           </p:sp>
         </mc:Choice>
-        <mc:Fallback>
+        <mc:Fallback xmlns="">
           <p:sp>
             <p:nvSpPr>
               <p:cNvPr id="11" name="TextBox 10">
@@ -14220,8 +14197,8 @@
           </p:sp>
         </mc:Fallback>
       </mc:AlternateContent>
-      <mc:AlternateContent xmlns:mc="http://schemas.openxmlformats.org/markup-compatibility/2006">
-        <mc:Choice xmlns:a14="http://schemas.microsoft.com/office/drawing/2010/main" Requires="a14">
+      <mc:AlternateContent xmlns:mc="http://schemas.openxmlformats.org/markup-compatibility/2006" xmlns:a14="http://schemas.microsoft.com/office/drawing/2010/main">
+        <mc:Choice Requires="a14">
           <p:sp>
             <p:nvSpPr>
               <p:cNvPr id="12" name="TextBox 11">
@@ -14250,6 +14227,7 @@
               </a:bodyPr>
               <a:lstStyle/>
               <a:p>
+                <a:pPr/>
                 <a14:m>
                   <m:oMathPara xmlns:m="http://schemas.openxmlformats.org/officeDocument/2006/math">
                     <m:oMathParaPr>
@@ -14466,7 +14444,7 @@
             </p:txBody>
           </p:sp>
         </mc:Choice>
-        <mc:Fallback>
+        <mc:Fallback xmlns="">
           <p:sp>
             <p:nvSpPr>
               <p:cNvPr id="12" name="TextBox 11">
@@ -14557,8 +14535,8 @@
           </a:p>
         </p:txBody>
       </p:sp>
-      <mc:AlternateContent xmlns:mc="http://schemas.openxmlformats.org/markup-compatibility/2006">
-        <mc:Choice xmlns:a14="http://schemas.microsoft.com/office/drawing/2010/main" Requires="a14">
+      <mc:AlternateContent xmlns:mc="http://schemas.openxmlformats.org/markup-compatibility/2006" xmlns:a14="http://schemas.microsoft.com/office/drawing/2010/main">
+        <mc:Choice Requires="a14">
           <p:sp>
             <p:nvSpPr>
               <p:cNvPr id="14" name="TextBox 13">
@@ -14680,7 +14658,7 @@
             </p:txBody>
           </p:sp>
         </mc:Choice>
-        <mc:Fallback>
+        <mc:Fallback xmlns="">
           <p:sp>
             <p:nvSpPr>
               <p:cNvPr id="14" name="TextBox 13">
@@ -14824,8 +14802,8 @@
           </a:prstGeom>
         </p:spPr>
       </p:pic>
-      <mc:AlternateContent xmlns:mc="http://schemas.openxmlformats.org/markup-compatibility/2006">
-        <mc:Choice xmlns:a14="http://schemas.microsoft.com/office/drawing/2010/main" Requires="a14">
+      <mc:AlternateContent xmlns:mc="http://schemas.openxmlformats.org/markup-compatibility/2006" xmlns:a14="http://schemas.microsoft.com/office/drawing/2010/main">
+        <mc:Choice Requires="a14">
           <p:sp>
             <p:nvSpPr>
               <p:cNvPr id="8" name="TextBox 7">
@@ -15062,7 +15040,7 @@
             </p:txBody>
           </p:sp>
         </mc:Choice>
-        <mc:Fallback>
+        <mc:Fallback xmlns="">
           <p:sp>
             <p:nvSpPr>
               <p:cNvPr id="8" name="TextBox 7">
@@ -16124,8 +16102,8 @@
               </p:txBody>
             </p:sp>
           </p:grpSp>
-          <mc:AlternateContent xmlns:mc="http://schemas.openxmlformats.org/markup-compatibility/2006">
-            <mc:Choice xmlns:a14="http://schemas.microsoft.com/office/drawing/2010/main" Requires="a14">
+          <mc:AlternateContent xmlns:mc="http://schemas.openxmlformats.org/markup-compatibility/2006" xmlns:a14="http://schemas.microsoft.com/office/drawing/2010/main">
+            <mc:Choice Requires="a14">
               <p:sp>
                 <p:nvSpPr>
                   <p:cNvPr id="20" name="TextBox 19">
@@ -16176,7 +16154,7 @@
                 </p:txBody>
               </p:sp>
             </mc:Choice>
-            <mc:Fallback>
+            <mc:Fallback xmlns="">
               <p:sp>
                 <p:nvSpPr>
                   <p:cNvPr id="20" name="TextBox 19">
@@ -16221,8 +16199,8 @@
               </p:sp>
             </mc:Fallback>
           </mc:AlternateContent>
-          <mc:AlternateContent xmlns:mc="http://schemas.openxmlformats.org/markup-compatibility/2006">
-            <mc:Choice xmlns:a14="http://schemas.microsoft.com/office/drawing/2010/main" Requires="a14">
+          <mc:AlternateContent xmlns:mc="http://schemas.openxmlformats.org/markup-compatibility/2006" xmlns:a14="http://schemas.microsoft.com/office/drawing/2010/main">
+            <mc:Choice Requires="a14">
               <p:sp>
                 <p:nvSpPr>
                   <p:cNvPr id="21" name="TextBox 20">
@@ -16272,7 +16250,7 @@
                 </p:txBody>
               </p:sp>
             </mc:Choice>
-            <mc:Fallback>
+            <mc:Fallback xmlns="">
               <p:sp>
                 <p:nvSpPr>
                   <p:cNvPr id="21" name="TextBox 20">
@@ -16317,8 +16295,8 @@
               </p:sp>
             </mc:Fallback>
           </mc:AlternateContent>
-          <mc:AlternateContent xmlns:mc="http://schemas.openxmlformats.org/markup-compatibility/2006">
-            <mc:Choice xmlns:a14="http://schemas.microsoft.com/office/drawing/2010/main" Requires="a14">
+          <mc:AlternateContent xmlns:mc="http://schemas.openxmlformats.org/markup-compatibility/2006" xmlns:a14="http://schemas.microsoft.com/office/drawing/2010/main">
+            <mc:Choice Requires="a14">
               <p:sp>
                 <p:nvSpPr>
                   <p:cNvPr id="22" name="TextBox 21">
@@ -16374,7 +16352,7 @@
                 </p:txBody>
               </p:sp>
             </mc:Choice>
-            <mc:Fallback>
+            <mc:Fallback xmlns="">
               <p:sp>
                 <p:nvSpPr>
                   <p:cNvPr id="22" name="TextBox 21">
@@ -16419,8 +16397,8 @@
               </p:sp>
             </mc:Fallback>
           </mc:AlternateContent>
-          <mc:AlternateContent xmlns:mc="http://schemas.openxmlformats.org/markup-compatibility/2006">
-            <mc:Choice xmlns:a14="http://schemas.microsoft.com/office/drawing/2010/main" Requires="a14">
+          <mc:AlternateContent xmlns:mc="http://schemas.openxmlformats.org/markup-compatibility/2006" xmlns:a14="http://schemas.microsoft.com/office/drawing/2010/main">
+            <mc:Choice Requires="a14">
               <p:sp>
                 <p:nvSpPr>
                   <p:cNvPr id="23" name="TextBox 22">
@@ -16476,7 +16454,7 @@
                 </p:txBody>
               </p:sp>
             </mc:Choice>
-            <mc:Fallback>
+            <mc:Fallback xmlns="">
               <p:sp>
                 <p:nvSpPr>
                   <p:cNvPr id="23" name="TextBox 22">
@@ -16521,8 +16499,8 @@
               </p:sp>
             </mc:Fallback>
           </mc:AlternateContent>
-          <mc:AlternateContent xmlns:mc="http://schemas.openxmlformats.org/markup-compatibility/2006">
-            <mc:Choice xmlns:a14="http://schemas.microsoft.com/office/drawing/2010/main" Requires="a14">
+          <mc:AlternateContent xmlns:mc="http://schemas.openxmlformats.org/markup-compatibility/2006" xmlns:a14="http://schemas.microsoft.com/office/drawing/2010/main">
+            <mc:Choice Requires="a14">
               <p:sp>
                 <p:nvSpPr>
                   <p:cNvPr id="24" name="TextBox 23">
@@ -16572,7 +16550,7 @@
                 </p:txBody>
               </p:sp>
             </mc:Choice>
-            <mc:Fallback>
+            <mc:Fallback xmlns="">
               <p:sp>
                 <p:nvSpPr>
                   <p:cNvPr id="24" name="TextBox 23">
@@ -16617,8 +16595,8 @@
               </p:sp>
             </mc:Fallback>
           </mc:AlternateContent>
-          <mc:AlternateContent xmlns:mc="http://schemas.openxmlformats.org/markup-compatibility/2006">
-            <mc:Choice xmlns:a14="http://schemas.microsoft.com/office/drawing/2010/main" Requires="a14">
+          <mc:AlternateContent xmlns:mc="http://schemas.openxmlformats.org/markup-compatibility/2006" xmlns:a14="http://schemas.microsoft.com/office/drawing/2010/main">
+            <mc:Choice Requires="a14">
               <p:sp>
                 <p:nvSpPr>
                   <p:cNvPr id="25" name="TextBox 24">
@@ -16668,7 +16646,7 @@
                 </p:txBody>
               </p:sp>
             </mc:Choice>
-            <mc:Fallback>
+            <mc:Fallback xmlns="">
               <p:sp>
                 <p:nvSpPr>
                   <p:cNvPr id="25" name="TextBox 24">
@@ -16713,8 +16691,8 @@
               </p:sp>
             </mc:Fallback>
           </mc:AlternateContent>
-          <mc:AlternateContent xmlns:mc="http://schemas.openxmlformats.org/markup-compatibility/2006">
-            <mc:Choice xmlns:a14="http://schemas.microsoft.com/office/drawing/2010/main" Requires="a14">
+          <mc:AlternateContent xmlns:mc="http://schemas.openxmlformats.org/markup-compatibility/2006" xmlns:a14="http://schemas.microsoft.com/office/drawing/2010/main">
+            <mc:Choice Requires="a14">
               <p:sp>
                 <p:nvSpPr>
                   <p:cNvPr id="26" name="TextBox 25">
@@ -16770,7 +16748,7 @@
                 </p:txBody>
               </p:sp>
             </mc:Choice>
-            <mc:Fallback>
+            <mc:Fallback xmlns="">
               <p:sp>
                 <p:nvSpPr>
                   <p:cNvPr id="26" name="TextBox 25">
@@ -16815,8 +16793,8 @@
               </p:sp>
             </mc:Fallback>
           </mc:AlternateContent>
-          <mc:AlternateContent xmlns:mc="http://schemas.openxmlformats.org/markup-compatibility/2006">
-            <mc:Choice xmlns:a14="http://schemas.microsoft.com/office/drawing/2010/main" Requires="a14">
+          <mc:AlternateContent xmlns:mc="http://schemas.openxmlformats.org/markup-compatibility/2006" xmlns:a14="http://schemas.microsoft.com/office/drawing/2010/main">
+            <mc:Choice Requires="a14">
               <p:sp>
                 <p:nvSpPr>
                   <p:cNvPr id="27" name="TextBox 26">
@@ -16856,13 +16834,7 @@
                             <a:rPr lang="en-US" sz="2400" b="0" i="1" smtClean="0">
                               <a:latin typeface="Cambria Math" panose="02040503050406030204" pitchFamily="18" charset="0"/>
                             </a:rPr>
-                            <m:t>10</m:t>
-                          </m:r>
-                          <m:r>
-                            <a:rPr lang="en-US" sz="2400" b="0" i="1" smtClean="0">
-                              <a:latin typeface="Cambria Math" panose="02040503050406030204" pitchFamily="18" charset="0"/>
-                            </a:rPr>
-                            <m:t>00</m:t>
+                            <m:t>1000</m:t>
                           </m:r>
                         </m:oMath>
                       </m:oMathPara>
@@ -16872,7 +16844,7 @@
                 </p:txBody>
               </p:sp>
             </mc:Choice>
-            <mc:Fallback>
+            <mc:Fallback xmlns="">
               <p:sp>
                 <p:nvSpPr>
                   <p:cNvPr id="27" name="TextBox 26">
@@ -16917,8 +16889,8 @@
               </p:sp>
             </mc:Fallback>
           </mc:AlternateContent>
-          <mc:AlternateContent xmlns:mc="http://schemas.openxmlformats.org/markup-compatibility/2006">
-            <mc:Choice xmlns:a14="http://schemas.microsoft.com/office/drawing/2010/main" Requires="a14">
+          <mc:AlternateContent xmlns:mc="http://schemas.openxmlformats.org/markup-compatibility/2006" xmlns:a14="http://schemas.microsoft.com/office/drawing/2010/main">
+            <mc:Choice Requires="a14">
               <p:sp>
                 <p:nvSpPr>
                   <p:cNvPr id="28" name="TextBox 27">
@@ -16958,13 +16930,7 @@
                             <a:rPr lang="en-US" sz="2400" b="0" i="1" smtClean="0">
                               <a:latin typeface="Cambria Math" panose="02040503050406030204" pitchFamily="18" charset="0"/>
                             </a:rPr>
-                            <m:t>15</m:t>
-                          </m:r>
-                          <m:r>
-                            <a:rPr lang="en-US" sz="2400" b="0" i="1" smtClean="0">
-                              <a:latin typeface="Cambria Math" panose="02040503050406030204" pitchFamily="18" charset="0"/>
-                            </a:rPr>
-                            <m:t>00</m:t>
+                            <m:t>1500</m:t>
                           </m:r>
                         </m:oMath>
                       </m:oMathPara>
@@ -16974,7 +16940,7 @@
                 </p:txBody>
               </p:sp>
             </mc:Choice>
-            <mc:Fallback>
+            <mc:Fallback xmlns="">
               <p:sp>
                 <p:nvSpPr>
                   <p:cNvPr id="28" name="TextBox 27">
@@ -17019,8 +16985,8 @@
               </p:sp>
             </mc:Fallback>
           </mc:AlternateContent>
-          <mc:AlternateContent xmlns:mc="http://schemas.openxmlformats.org/markup-compatibility/2006">
-            <mc:Choice xmlns:a14="http://schemas.microsoft.com/office/drawing/2010/main" Requires="a14">
+          <mc:AlternateContent xmlns:mc="http://schemas.openxmlformats.org/markup-compatibility/2006" xmlns:a14="http://schemas.microsoft.com/office/drawing/2010/main">
+            <mc:Choice Requires="a14">
               <p:sp>
                 <p:nvSpPr>
                   <p:cNvPr id="29" name="TextBox 28">
@@ -17060,13 +17026,7 @@
                             <a:rPr lang="en-US" sz="2400" b="0" i="1" smtClean="0">
                               <a:latin typeface="Cambria Math" panose="02040503050406030204" pitchFamily="18" charset="0"/>
                             </a:rPr>
-                            <m:t>20</m:t>
-                          </m:r>
-                          <m:r>
-                            <a:rPr lang="en-US" sz="2400" b="0" i="1" smtClean="0">
-                              <a:latin typeface="Cambria Math" panose="02040503050406030204" pitchFamily="18" charset="0"/>
-                            </a:rPr>
-                            <m:t>00</m:t>
+                            <m:t>2000</m:t>
                           </m:r>
                         </m:oMath>
                       </m:oMathPara>
@@ -17076,7 +17036,7 @@
                 </p:txBody>
               </p:sp>
             </mc:Choice>
-            <mc:Fallback>
+            <mc:Fallback xmlns="">
               <p:sp>
                 <p:nvSpPr>
                   <p:cNvPr id="29" name="TextBox 28">
@@ -17121,8 +17081,8 @@
               </p:sp>
             </mc:Fallback>
           </mc:AlternateContent>
-          <mc:AlternateContent xmlns:mc="http://schemas.openxmlformats.org/markup-compatibility/2006">
-            <mc:Choice xmlns:a14="http://schemas.microsoft.com/office/drawing/2010/main" Requires="a14">
+          <mc:AlternateContent xmlns:mc="http://schemas.openxmlformats.org/markup-compatibility/2006" xmlns:a14="http://schemas.microsoft.com/office/drawing/2010/main">
+            <mc:Choice Requires="a14">
               <p:sp>
                 <p:nvSpPr>
                   <p:cNvPr id="30" name="TextBox 29">
@@ -17162,13 +17122,7 @@
                             <a:rPr lang="en-US" sz="2400" b="0" i="1" smtClean="0">
                               <a:latin typeface="Cambria Math" panose="02040503050406030204" pitchFamily="18" charset="0"/>
                             </a:rPr>
-                            <m:t>25</m:t>
-                          </m:r>
-                          <m:r>
-                            <a:rPr lang="en-US" sz="2400" b="0" i="1" smtClean="0">
-                              <a:latin typeface="Cambria Math" panose="02040503050406030204" pitchFamily="18" charset="0"/>
-                            </a:rPr>
-                            <m:t>00</m:t>
+                            <m:t>2500</m:t>
                           </m:r>
                         </m:oMath>
                       </m:oMathPara>
@@ -17178,7 +17132,7 @@
                 </p:txBody>
               </p:sp>
             </mc:Choice>
-            <mc:Fallback>
+            <mc:Fallback xmlns="">
               <p:sp>
                 <p:nvSpPr>
                   <p:cNvPr id="30" name="TextBox 29">
@@ -17224,8 +17178,8 @@
             </mc:Fallback>
           </mc:AlternateContent>
         </p:grpSp>
-        <mc:AlternateContent xmlns:mc="http://schemas.openxmlformats.org/markup-compatibility/2006">
-          <mc:Choice xmlns:a14="http://schemas.microsoft.com/office/drawing/2010/main" Requires="a14">
+        <mc:AlternateContent xmlns:mc="http://schemas.openxmlformats.org/markup-compatibility/2006" xmlns:a14="http://schemas.microsoft.com/office/drawing/2010/main">
+          <mc:Choice Requires="a14">
             <p:sp>
               <p:nvSpPr>
                 <p:cNvPr id="17" name="TextBox 16">
@@ -17299,7 +17253,7 @@
               </p:txBody>
             </p:sp>
           </mc:Choice>
-          <mc:Fallback>
+          <mc:Fallback xmlns="">
             <p:sp>
               <p:nvSpPr>
                 <p:cNvPr id="17" name="TextBox 16">
@@ -17344,8 +17298,8 @@
             </p:sp>
           </mc:Fallback>
         </mc:AlternateContent>
-        <mc:AlternateContent xmlns:mc="http://schemas.openxmlformats.org/markup-compatibility/2006">
-          <mc:Choice xmlns:a14="http://schemas.microsoft.com/office/drawing/2010/main" Requires="a14">
+        <mc:AlternateContent xmlns:mc="http://schemas.openxmlformats.org/markup-compatibility/2006" xmlns:a14="http://schemas.microsoft.com/office/drawing/2010/main">
+          <mc:Choice Requires="a14">
             <p:sp>
               <p:nvSpPr>
                 <p:cNvPr id="18" name="TextBox 17">
@@ -17419,7 +17373,7 @@
               </p:txBody>
             </p:sp>
           </mc:Choice>
-          <mc:Fallback>
+          <mc:Fallback xmlns="">
             <p:sp>
               <p:nvSpPr>
                 <p:cNvPr id="18" name="TextBox 17">
@@ -17465,8 +17419,8 @@
           </mc:Fallback>
         </mc:AlternateContent>
       </p:grpSp>
-      <mc:AlternateContent xmlns:mc="http://schemas.openxmlformats.org/markup-compatibility/2006">
-        <mc:Choice xmlns:a14="http://schemas.microsoft.com/office/drawing/2010/main" Requires="a14">
+      <mc:AlternateContent xmlns:mc="http://schemas.openxmlformats.org/markup-compatibility/2006" xmlns:a14="http://schemas.microsoft.com/office/drawing/2010/main">
+        <mc:Choice Requires="a14">
           <p:sp>
             <p:nvSpPr>
               <p:cNvPr id="53" name="TextBox 52">
@@ -17672,7 +17626,7 @@
             </p:txBody>
           </p:sp>
         </mc:Choice>
-        <mc:Fallback>
+        <mc:Fallback xmlns="">
           <p:sp>
             <p:nvSpPr>
               <p:cNvPr id="53" name="TextBox 52">
@@ -17717,8 +17671,8 @@
           </p:sp>
         </mc:Fallback>
       </mc:AlternateContent>
-      <mc:AlternateContent xmlns:mc="http://schemas.openxmlformats.org/markup-compatibility/2006">
-        <mc:Choice xmlns:a14="http://schemas.microsoft.com/office/drawing/2010/main" Requires="a14">
+      <mc:AlternateContent xmlns:mc="http://schemas.openxmlformats.org/markup-compatibility/2006" xmlns:a14="http://schemas.microsoft.com/office/drawing/2010/main">
+        <mc:Choice Requires="a14">
           <p:sp>
             <p:nvSpPr>
               <p:cNvPr id="60" name="TextBox 59">
@@ -17868,7 +17822,7 @@
             </p:txBody>
           </p:sp>
         </mc:Choice>
-        <mc:Fallback>
+        <mc:Fallback xmlns="">
           <p:sp>
             <p:nvSpPr>
               <p:cNvPr id="60" name="TextBox 59">
@@ -17913,8 +17867,8 @@
           </p:sp>
         </mc:Fallback>
       </mc:AlternateContent>
-      <mc:AlternateContent xmlns:mc="http://schemas.openxmlformats.org/markup-compatibility/2006">
-        <mc:Choice xmlns:a14="http://schemas.microsoft.com/office/drawing/2010/main" Requires="a14">
+      <mc:AlternateContent xmlns:mc="http://schemas.openxmlformats.org/markup-compatibility/2006" xmlns:a14="http://schemas.microsoft.com/office/drawing/2010/main">
+        <mc:Choice Requires="a14">
           <p:sp>
             <p:nvSpPr>
               <p:cNvPr id="61" name="TextBox 60">
@@ -18120,7 +18074,7 @@
             </p:txBody>
           </p:sp>
         </mc:Choice>
-        <mc:Fallback>
+        <mc:Fallback xmlns="">
           <p:sp>
             <p:nvSpPr>
               <p:cNvPr id="61" name="TextBox 60">
@@ -18292,8 +18246,8 @@
           </a:prstGeom>
         </p:spPr>
       </p:pic>
-      <mc:AlternateContent xmlns:mc="http://schemas.openxmlformats.org/markup-compatibility/2006">
-        <mc:Choice xmlns:a14="http://schemas.microsoft.com/office/drawing/2010/main" Requires="a14">
+      <mc:AlternateContent xmlns:mc="http://schemas.openxmlformats.org/markup-compatibility/2006" xmlns:a14="http://schemas.microsoft.com/office/drawing/2010/main">
+        <mc:Choice Requires="a14">
           <p:sp>
             <p:nvSpPr>
               <p:cNvPr id="15" name="TextBox 14">
@@ -18389,7 +18343,7 @@
             </p:txBody>
           </p:sp>
         </mc:Choice>
-        <mc:Fallback>
+        <mc:Fallback xmlns="">
           <p:sp>
             <p:nvSpPr>
               <p:cNvPr id="15" name="TextBox 14">
@@ -18434,8 +18388,8 @@
           </p:sp>
         </mc:Fallback>
       </mc:AlternateContent>
-      <mc:AlternateContent xmlns:mc="http://schemas.openxmlformats.org/markup-compatibility/2006">
-        <mc:Choice xmlns:a14="http://schemas.microsoft.com/office/drawing/2010/main" Requires="a14">
+      <mc:AlternateContent xmlns:mc="http://schemas.openxmlformats.org/markup-compatibility/2006" xmlns:a14="http://schemas.microsoft.com/office/drawing/2010/main">
+        <mc:Choice Requires="a14">
           <p:sp>
             <p:nvSpPr>
               <p:cNvPr id="16" name="TextBox 15">
@@ -18549,7 +18503,7 @@
             </p:txBody>
           </p:sp>
         </mc:Choice>
-        <mc:Fallback>
+        <mc:Fallback xmlns="">
           <p:sp>
             <p:nvSpPr>
               <p:cNvPr id="16" name="TextBox 15">
@@ -18594,8 +18548,8 @@
           </p:sp>
         </mc:Fallback>
       </mc:AlternateContent>
-      <mc:AlternateContent xmlns:mc="http://schemas.openxmlformats.org/markup-compatibility/2006">
-        <mc:Choice xmlns:a14="http://schemas.microsoft.com/office/drawing/2010/main" Requires="a14">
+      <mc:AlternateContent xmlns:mc="http://schemas.openxmlformats.org/markup-compatibility/2006" xmlns:a14="http://schemas.microsoft.com/office/drawing/2010/main">
+        <mc:Choice Requires="a14">
           <p:sp>
             <p:nvSpPr>
               <p:cNvPr id="17" name="TextBox 16">
@@ -18648,13 +18602,7 @@
                         <a:rPr lang="en-US" sz="2400" b="0" i="1" smtClean="0">
                           <a:latin typeface="Cambria Math" panose="02040503050406030204" pitchFamily="18" charset="0"/>
                         </a:rPr>
-                        <m:t>=</m:t>
-                      </m:r>
-                      <m:r>
-                        <a:rPr lang="en-US" sz="2400" b="0" i="1" smtClean="0">
-                          <a:latin typeface="Cambria Math" panose="02040503050406030204" pitchFamily="18" charset="0"/>
-                        </a:rPr>
-                        <m:t> </m:t>
+                        <m:t>= </m:t>
                       </m:r>
                       <m:f>
                         <m:fPr>
@@ -18704,7 +18652,7 @@
             </p:txBody>
           </p:sp>
         </mc:Choice>
-        <mc:Fallback>
+        <mc:Fallback xmlns="">
           <p:sp>
             <p:nvSpPr>
               <p:cNvPr id="17" name="TextBox 16">
@@ -18953,8 +18901,8 @@
           </a:p>
         </p:txBody>
       </p:sp>
-      <mc:AlternateContent xmlns:mc="http://schemas.openxmlformats.org/markup-compatibility/2006">
-        <mc:Choice xmlns:a14="http://schemas.microsoft.com/office/drawing/2010/main" Requires="a14">
+      <mc:AlternateContent xmlns:mc="http://schemas.openxmlformats.org/markup-compatibility/2006" xmlns:a14="http://schemas.microsoft.com/office/drawing/2010/main">
+        <mc:Choice Requires="a14">
           <p:sp>
             <p:nvSpPr>
               <p:cNvPr id="19" name="TextBox 18">
@@ -19032,7 +18980,7 @@
             </p:txBody>
           </p:sp>
         </mc:Choice>
-        <mc:Fallback>
+        <mc:Fallback xmlns="">
           <p:sp>
             <p:nvSpPr>
               <p:cNvPr id="19" name="TextBox 18">

</xml_diff>

<commit_message>
add for day 3
</commit_message>
<xml_diff>
--- a/2_basic_regression.pptx
+++ b/2_basic_regression.pptx
@@ -289,7 +289,7 @@
           <a:p>
             <a:fld id="{F7586D47-F1F0-42DF-BED0-72444DD7BEDA}" type="datetimeFigureOut">
               <a:rPr lang="en-ID" smtClean="0"/>
-              <a:t>08/08/2021</a:t>
+              <a:t>14/08/2021</a:t>
             </a:fld>
             <a:endParaRPr lang="en-ID"/>
           </a:p>
@@ -489,7 +489,7 @@
           <a:p>
             <a:fld id="{F7586D47-F1F0-42DF-BED0-72444DD7BEDA}" type="datetimeFigureOut">
               <a:rPr lang="en-ID" smtClean="0"/>
-              <a:t>08/08/2021</a:t>
+              <a:t>14/08/2021</a:t>
             </a:fld>
             <a:endParaRPr lang="en-ID"/>
           </a:p>
@@ -699,7 +699,7 @@
           <a:p>
             <a:fld id="{F7586D47-F1F0-42DF-BED0-72444DD7BEDA}" type="datetimeFigureOut">
               <a:rPr lang="en-ID" smtClean="0"/>
-              <a:t>08/08/2021</a:t>
+              <a:t>14/08/2021</a:t>
             </a:fld>
             <a:endParaRPr lang="en-ID"/>
           </a:p>
@@ -899,7 +899,7 @@
           <a:p>
             <a:fld id="{F7586D47-F1F0-42DF-BED0-72444DD7BEDA}" type="datetimeFigureOut">
               <a:rPr lang="en-ID" smtClean="0"/>
-              <a:t>08/08/2021</a:t>
+              <a:t>14/08/2021</a:t>
             </a:fld>
             <a:endParaRPr lang="en-ID"/>
           </a:p>
@@ -1175,7 +1175,7 @@
           <a:p>
             <a:fld id="{F7586D47-F1F0-42DF-BED0-72444DD7BEDA}" type="datetimeFigureOut">
               <a:rPr lang="en-ID" smtClean="0"/>
-              <a:t>08/08/2021</a:t>
+              <a:t>14/08/2021</a:t>
             </a:fld>
             <a:endParaRPr lang="en-ID"/>
           </a:p>
@@ -1443,7 +1443,7 @@
           <a:p>
             <a:fld id="{F7586D47-F1F0-42DF-BED0-72444DD7BEDA}" type="datetimeFigureOut">
               <a:rPr lang="en-ID" smtClean="0"/>
-              <a:t>08/08/2021</a:t>
+              <a:t>14/08/2021</a:t>
             </a:fld>
             <a:endParaRPr lang="en-ID"/>
           </a:p>
@@ -1858,7 +1858,7 @@
           <a:p>
             <a:fld id="{F7586D47-F1F0-42DF-BED0-72444DD7BEDA}" type="datetimeFigureOut">
               <a:rPr lang="en-ID" smtClean="0"/>
-              <a:t>08/08/2021</a:t>
+              <a:t>14/08/2021</a:t>
             </a:fld>
             <a:endParaRPr lang="en-ID"/>
           </a:p>
@@ -2000,7 +2000,7 @@
           <a:p>
             <a:fld id="{F7586D47-F1F0-42DF-BED0-72444DD7BEDA}" type="datetimeFigureOut">
               <a:rPr lang="en-ID" smtClean="0"/>
-              <a:t>08/08/2021</a:t>
+              <a:t>14/08/2021</a:t>
             </a:fld>
             <a:endParaRPr lang="en-ID"/>
           </a:p>
@@ -2113,7 +2113,7 @@
           <a:p>
             <a:fld id="{F7586D47-F1F0-42DF-BED0-72444DD7BEDA}" type="datetimeFigureOut">
               <a:rPr lang="en-ID" smtClean="0"/>
-              <a:t>08/08/2021</a:t>
+              <a:t>14/08/2021</a:t>
             </a:fld>
             <a:endParaRPr lang="en-ID"/>
           </a:p>
@@ -2426,7 +2426,7 @@
           <a:p>
             <a:fld id="{F7586D47-F1F0-42DF-BED0-72444DD7BEDA}" type="datetimeFigureOut">
               <a:rPr lang="en-ID" smtClean="0"/>
-              <a:t>08/08/2021</a:t>
+              <a:t>14/08/2021</a:t>
             </a:fld>
             <a:endParaRPr lang="en-ID"/>
           </a:p>
@@ -2715,7 +2715,7 @@
           <a:p>
             <a:fld id="{F7586D47-F1F0-42DF-BED0-72444DD7BEDA}" type="datetimeFigureOut">
               <a:rPr lang="en-ID" smtClean="0"/>
-              <a:t>08/08/2021</a:t>
+              <a:t>14/08/2021</a:t>
             </a:fld>
             <a:endParaRPr lang="en-ID"/>
           </a:p>
@@ -2958,7 +2958,7 @@
           <a:p>
             <a:fld id="{F7586D47-F1F0-42DF-BED0-72444DD7BEDA}" type="datetimeFigureOut">
               <a:rPr lang="en-ID" smtClean="0"/>
-              <a:t>08/08/2021</a:t>
+              <a:t>14/08/2021</a:t>
             </a:fld>
             <a:endParaRPr lang="en-ID"/>
           </a:p>
@@ -3397,10 +3397,10 @@
           <a:lstStyle/>
           <a:p>
             <a:r>
-              <a:rPr lang="en-US" dirty="0"/>
+              <a:rPr lang="en-US" b="1" dirty="0"/>
               <a:t>Basic Regression</a:t>
             </a:r>
-            <a:endParaRPr lang="en-ID" dirty="0"/>
+            <a:endParaRPr lang="en-ID" b="1" dirty="0"/>
           </a:p>
         </p:txBody>
       </p:sp>
@@ -4227,13 +4227,13 @@
         </p:nvSpPr>
         <p:spPr>
           <a:xfrm>
-            <a:off x="838200" y="5147213"/>
-            <a:ext cx="10515600" cy="1415578"/>
+            <a:off x="955767" y="5012231"/>
+            <a:ext cx="7616734" cy="1707316"/>
           </a:xfrm>
         </p:spPr>
         <p:txBody>
           <a:bodyPr>
-            <a:normAutofit/>
+            <a:normAutofit lnSpcReduction="10000"/>
           </a:bodyPr>
           <a:lstStyle/>
           <a:p>
@@ -4263,7 +4263,18 @@
             </a:br>
             <a:r>
               <a:rPr lang="en-US" dirty="0"/>
-              <a:t>2_2_linear_regression_gradient_descent.ipynb </a:t>
+              <a:t>2_2_linear_regression_gradient_descent_from</a:t>
+            </a:r>
+            <a:br>
+              <a:rPr lang="en-US" dirty="0"/>
+            </a:br>
+            <a:r>
+              <a:rPr lang="en-US" dirty="0" err="1"/>
+              <a:t>scratch.ipynb</a:t>
+            </a:r>
+            <a:r>
+              <a:rPr lang="en-US" dirty="0"/>
+              <a:t> </a:t>
             </a:r>
             <a:r>
               <a:rPr lang="en-US" dirty="0">
@@ -4281,8 +4292,8 @@
           </a:p>
         </p:txBody>
       </p:sp>
-      <mc:AlternateContent xmlns:mc="http://schemas.openxmlformats.org/markup-compatibility/2006" xmlns:a14="http://schemas.microsoft.com/office/drawing/2010/main">
-        <mc:Choice Requires="a14">
+      <mc:AlternateContent xmlns:mc="http://schemas.openxmlformats.org/markup-compatibility/2006">
+        <mc:Choice xmlns:a14="http://schemas.microsoft.com/office/drawing/2010/main" Requires="a14">
           <p:sp>
             <p:nvSpPr>
               <p:cNvPr id="55" name="TextBox 54">
@@ -4297,7 +4308,7 @@
             </p:nvSpPr>
             <p:spPr>
               <a:xfrm>
-                <a:off x="1930400" y="4521558"/>
+                <a:off x="1930400" y="4403991"/>
                 <a:ext cx="1689100" cy="830997"/>
               </a:xfrm>
               <a:prstGeom prst="rect">
@@ -4356,7 +4367,7 @@
             </p:txBody>
           </p:sp>
         </mc:Choice>
-        <mc:Fallback xmlns="">
+        <mc:Fallback>
           <p:sp>
             <p:nvSpPr>
               <p:cNvPr id="55" name="TextBox 54">
@@ -4373,7 +4384,7 @@
             </p:nvSpPr>
             <p:spPr>
               <a:xfrm>
-                <a:off x="1930400" y="4521558"/>
+                <a:off x="1930400" y="4403991"/>
                 <a:ext cx="1689100" cy="830997"/>
               </a:xfrm>
               <a:prstGeom prst="rect">
@@ -4382,7 +4393,7 @@
               <a:blipFill>
                 <a:blip r:embed="rId3"/>
                 <a:stretch>
-                  <a:fillRect l="-1083" t="-5882" b="-16176"/>
+                  <a:fillRect l="-1083" t="-5839" b="-15328"/>
                 </a:stretch>
               </a:blipFill>
             </p:spPr>
@@ -4401,8 +4412,8 @@
           </p:sp>
         </mc:Fallback>
       </mc:AlternateContent>
-      <mc:AlternateContent xmlns:mc="http://schemas.openxmlformats.org/markup-compatibility/2006" xmlns:a14="http://schemas.microsoft.com/office/drawing/2010/main">
-        <mc:Choice Requires="a14">
+      <mc:AlternateContent xmlns:mc="http://schemas.openxmlformats.org/markup-compatibility/2006">
+        <mc:Choice xmlns:a14="http://schemas.microsoft.com/office/drawing/2010/main" Requires="a14">
           <p:sp>
             <p:nvSpPr>
               <p:cNvPr id="56" name="TextBox 55">
@@ -4417,8 +4428,8 @@
             </p:nvSpPr>
             <p:spPr>
               <a:xfrm>
-                <a:off x="5422897" y="4510671"/>
-                <a:ext cx="1689100" cy="830997"/>
+                <a:off x="5794109" y="4432293"/>
+                <a:ext cx="1422392" cy="830997"/>
               </a:xfrm>
               <a:prstGeom prst="rect">
                 <a:avLst/>
@@ -4476,7 +4487,7 @@
             </p:txBody>
           </p:sp>
         </mc:Choice>
-        <mc:Fallback xmlns="">
+        <mc:Fallback>
           <p:sp>
             <p:nvSpPr>
               <p:cNvPr id="56" name="TextBox 55">
@@ -4493,8 +4504,8 @@
             </p:nvSpPr>
             <p:spPr>
               <a:xfrm>
-                <a:off x="5422897" y="4510671"/>
-                <a:ext cx="1689100" cy="830997"/>
+                <a:off x="5794109" y="4432293"/>
+                <a:ext cx="1422392" cy="830997"/>
               </a:xfrm>
               <a:prstGeom prst="rect">
                 <a:avLst/>
@@ -4502,7 +4513,7 @@
               <a:blipFill>
                 <a:blip r:embed="rId4"/>
                 <a:stretch>
-                  <a:fillRect l="-1083" t="-5882" b="-16176"/>
+                  <a:fillRect l="-855" t="-5882" b="-16176"/>
                 </a:stretch>
               </a:blipFill>
             </p:spPr>
@@ -4521,8 +4532,8 @@
           </p:sp>
         </mc:Fallback>
       </mc:AlternateContent>
-      <mc:AlternateContent xmlns:mc="http://schemas.openxmlformats.org/markup-compatibility/2006" xmlns:a14="http://schemas.microsoft.com/office/drawing/2010/main">
-        <mc:Choice Requires="a14">
+      <mc:AlternateContent xmlns:mc="http://schemas.openxmlformats.org/markup-compatibility/2006">
+        <mc:Choice xmlns:a14="http://schemas.microsoft.com/office/drawing/2010/main" Requires="a14">
           <p:sp>
             <p:nvSpPr>
               <p:cNvPr id="57" name="TextBox 56">
@@ -4537,7 +4548,7 @@
             </p:nvSpPr>
             <p:spPr>
               <a:xfrm>
-                <a:off x="9137652" y="4508858"/>
+                <a:off x="9137652" y="4417417"/>
                 <a:ext cx="1689100" cy="830997"/>
               </a:xfrm>
               <a:prstGeom prst="rect">
@@ -4596,7 +4607,7 @@
             </p:txBody>
           </p:sp>
         </mc:Choice>
-        <mc:Fallback xmlns="">
+        <mc:Fallback>
           <p:sp>
             <p:nvSpPr>
               <p:cNvPr id="57" name="TextBox 56">
@@ -4613,7 +4624,7 @@
             </p:nvSpPr>
             <p:spPr>
               <a:xfrm>
-                <a:off x="9137652" y="4508858"/>
+                <a:off x="9137652" y="4417417"/>
                 <a:ext cx="1689100" cy="830997"/>
               </a:xfrm>
               <a:prstGeom prst="rect">
@@ -12271,10 +12282,10 @@
           <a:lstStyle/>
           <a:p>
             <a:r>
-              <a:rPr lang="en-US" dirty="0"/>
+              <a:rPr lang="en-US" b="1" dirty="0"/>
               <a:t>With Scikit</a:t>
             </a:r>
-            <a:endParaRPr lang="en-ID" dirty="0"/>
+            <a:endParaRPr lang="en-ID" b="1" dirty="0"/>
           </a:p>
         </p:txBody>
       </p:sp>
@@ -12599,10 +12610,10 @@
           <a:lstStyle/>
           <a:p>
             <a:r>
-              <a:rPr lang="en-US" dirty="0"/>
+              <a:rPr lang="en-US" b="1" dirty="0"/>
               <a:t>With Normal Equation</a:t>
             </a:r>
-            <a:endParaRPr lang="en-ID" dirty="0"/>
+            <a:endParaRPr lang="en-ID" b="1" dirty="0"/>
           </a:p>
         </p:txBody>
       </p:sp>
@@ -13420,10 +13431,10 @@
           <a:lstStyle/>
           <a:p>
             <a:r>
-              <a:rPr lang="en-US" dirty="0"/>
+              <a:rPr lang="en-US" b="1" dirty="0"/>
               <a:t>Advancing Regression</a:t>
             </a:r>
-            <a:endParaRPr lang="en-ID" dirty="0"/>
+            <a:endParaRPr lang="en-ID" b="1" dirty="0"/>
           </a:p>
         </p:txBody>
       </p:sp>
@@ -19121,10 +19132,10 @@
           <a:lstStyle/>
           <a:p>
             <a:r>
-              <a:rPr lang="en-US" dirty="0"/>
+              <a:rPr lang="en-US" b="1" dirty="0"/>
               <a:t>LATIHAN</a:t>
             </a:r>
-            <a:endParaRPr lang="en-ID" dirty="0"/>
+            <a:endParaRPr lang="en-ID" b="1" dirty="0"/>
           </a:p>
         </p:txBody>
       </p:sp>
@@ -19474,10 +19485,10 @@
           <a:lstStyle/>
           <a:p>
             <a:r>
-              <a:rPr lang="en-US" dirty="0"/>
+              <a:rPr lang="en-US" b="1" dirty="0"/>
               <a:t>From Scratch</a:t>
             </a:r>
-            <a:endParaRPr lang="en-ID" dirty="0"/>
+            <a:endParaRPr lang="en-ID" b="1" dirty="0"/>
           </a:p>
         </p:txBody>
       </p:sp>

</xml_diff>